<commit_message>
Final .rmd and powerpoint
Reverted .rmd back to ARIMA model, got a slightly improved ARIMA model with "stepwise = FALSE" and finished the powerpoint.
</commit_message>
<xml_diff>
--- a/Predictions Powerpoint.pptx
+++ b/Predictions Powerpoint.pptx
@@ -4,11 +4,13 @@
   <p:sldMasterIdLst>
     <p:sldMasterId id="2147483648" r:id="rId1"/>
   </p:sldMasterIdLst>
+  <p:notesMasterIdLst>
+    <p:notesMasterId r:id="rId5"/>
+  </p:notesMasterIdLst>
   <p:sldIdLst>
     <p:sldId id="256" r:id="rId2"/>
     <p:sldId id="257" r:id="rId3"/>
     <p:sldId id="258" r:id="rId4"/>
-    <p:sldId id="259" r:id="rId5"/>
   </p:sldIdLst>
   <p:sldSz cx="12192000" cy="6858000"/>
   <p:notesSz cx="6858000" cy="9144000"/>
@@ -115,63 +117,442 @@
 </p:presentation>
 </file>
 
-<file path=ppt/changesInfos/changesInfo1.xml><?xml version="1.0" encoding="utf-8"?>
-<pc:chgInfo xmlns:a="http://schemas.openxmlformats.org/drawingml/2006/main" xmlns:r="http://schemas.openxmlformats.org/officeDocument/2006/relationships" xmlns:ac="http://schemas.microsoft.com/office/drawing/2013/main/command" xmlns:pc="http://schemas.microsoft.com/office/powerpoint/2013/main/command">
-  <pc:docChgLst>
-    <pc:chgData name="Megan Toale" userId="a1ab1853027d18ec" providerId="LiveId" clId="{AF84770E-210C-45E3-AD68-0F6F472A323F}"/>
-    <pc:docChg chg="custSel addSld modSld">
-      <pc:chgData name="Megan Toale" userId="a1ab1853027d18ec" providerId="LiveId" clId="{AF84770E-210C-45E3-AD68-0F6F472A323F}" dt="2022-05-03T20:29:57.208" v="24" actId="20577"/>
-      <pc:docMkLst>
-        <pc:docMk/>
-      </pc:docMkLst>
-      <pc:sldChg chg="modSp mod">
-        <pc:chgData name="Megan Toale" userId="a1ab1853027d18ec" providerId="LiveId" clId="{AF84770E-210C-45E3-AD68-0F6F472A323F}" dt="2022-05-03T20:20:38.196" v="5" actId="20577"/>
-        <pc:sldMkLst>
-          <pc:docMk/>
-          <pc:sldMk cId="1038865191" sldId="257"/>
-        </pc:sldMkLst>
-        <pc:spChg chg="mod">
-          <ac:chgData name="Megan Toale" userId="a1ab1853027d18ec" providerId="LiveId" clId="{AF84770E-210C-45E3-AD68-0F6F472A323F}" dt="2022-05-03T20:20:38.196" v="5" actId="20577"/>
-          <ac:spMkLst>
-            <pc:docMk/>
-            <pc:sldMk cId="1038865191" sldId="257"/>
-            <ac:spMk id="2" creationId="{DC235536-605F-A1D3-C4BE-28B73FE47E69}"/>
-          </ac:spMkLst>
-        </pc:spChg>
-      </pc:sldChg>
-      <pc:sldChg chg="modSp new mod">
-        <pc:chgData name="Megan Toale" userId="a1ab1853027d18ec" providerId="LiveId" clId="{AF84770E-210C-45E3-AD68-0F6F472A323F}" dt="2022-05-03T20:20:47.463" v="13" actId="5793"/>
-        <pc:sldMkLst>
-          <pc:docMk/>
-          <pc:sldMk cId="1532138533" sldId="258"/>
-        </pc:sldMkLst>
-        <pc:spChg chg="mod">
-          <ac:chgData name="Megan Toale" userId="a1ab1853027d18ec" providerId="LiveId" clId="{AF84770E-210C-45E3-AD68-0F6F472A323F}" dt="2022-05-03T20:20:47.463" v="13" actId="5793"/>
-          <ac:spMkLst>
-            <pc:docMk/>
-            <pc:sldMk cId="1532138533" sldId="258"/>
-            <ac:spMk id="2" creationId="{ECE11621-216B-1353-93F9-2735769FF8FF}"/>
-          </ac:spMkLst>
-        </pc:spChg>
-      </pc:sldChg>
-      <pc:sldChg chg="modSp new mod">
-        <pc:chgData name="Megan Toale" userId="a1ab1853027d18ec" providerId="LiveId" clId="{AF84770E-210C-45E3-AD68-0F6F472A323F}" dt="2022-05-03T20:29:57.208" v="24" actId="20577"/>
-        <pc:sldMkLst>
-          <pc:docMk/>
-          <pc:sldMk cId="2427808491" sldId="259"/>
-        </pc:sldMkLst>
-        <pc:spChg chg="mod">
-          <ac:chgData name="Megan Toale" userId="a1ab1853027d18ec" providerId="LiveId" clId="{AF84770E-210C-45E3-AD68-0F6F472A323F}" dt="2022-05-03T20:29:57.208" v="24" actId="20577"/>
-          <ac:spMkLst>
-            <pc:docMk/>
-            <pc:sldMk cId="2427808491" sldId="259"/>
-            <ac:spMk id="2" creationId="{81912C78-183B-ADF3-0F4E-273E285176D1}"/>
-          </ac:spMkLst>
-        </pc:spChg>
-      </pc:sldChg>
-    </pc:docChg>
-  </pc:docChgLst>
-</pc:chgInfo>
+<file path=ppt/notesMasters/notesMaster1.xml><?xml version="1.0" encoding="utf-8"?>
+<p:notesMaster xmlns:a="http://schemas.openxmlformats.org/drawingml/2006/main" xmlns:r="http://schemas.openxmlformats.org/officeDocument/2006/relationships" xmlns:p="http://schemas.openxmlformats.org/presentationml/2006/main">
+  <p:cSld>
+    <p:bg>
+      <p:bgRef idx="1001">
+        <a:schemeClr val="bg1"/>
+      </p:bgRef>
+    </p:bg>
+    <p:spTree>
+      <p:nvGrpSpPr>
+        <p:cNvPr id="1" name=""/>
+        <p:cNvGrpSpPr/>
+        <p:nvPr/>
+      </p:nvGrpSpPr>
+      <p:grpSpPr>
+        <a:xfrm>
+          <a:off x="0" y="0"/>
+          <a:ext cx="0" cy="0"/>
+          <a:chOff x="0" y="0"/>
+          <a:chExt cx="0" cy="0"/>
+        </a:xfrm>
+      </p:grpSpPr>
+      <p:sp>
+        <p:nvSpPr>
+          <p:cNvPr id="2" name="Header Placeholder 1"/>
+          <p:cNvSpPr>
+            <a:spLocks noGrp="1"/>
+          </p:cNvSpPr>
+          <p:nvPr>
+            <p:ph type="hdr" sz="quarter"/>
+          </p:nvPr>
+        </p:nvSpPr>
+        <p:spPr>
+          <a:xfrm>
+            <a:off x="0" y="0"/>
+            <a:ext cx="2971800" cy="458788"/>
+          </a:xfrm>
+          <a:prstGeom prst="rect">
+            <a:avLst/>
+          </a:prstGeom>
+        </p:spPr>
+        <p:txBody>
+          <a:bodyPr vert="horz" lIns="91440" tIns="45720" rIns="91440" bIns="45720" rtlCol="0"/>
+          <a:lstStyle>
+            <a:lvl1pPr algn="l">
+              <a:defRPr sz="1200"/>
+            </a:lvl1pPr>
+          </a:lstStyle>
+          <a:p>
+            <a:endParaRPr lang="es-ES"/>
+          </a:p>
+        </p:txBody>
+      </p:sp>
+      <p:sp>
+        <p:nvSpPr>
+          <p:cNvPr id="3" name="Date Placeholder 2"/>
+          <p:cNvSpPr>
+            <a:spLocks noGrp="1"/>
+          </p:cNvSpPr>
+          <p:nvPr>
+            <p:ph type="dt" idx="1"/>
+          </p:nvPr>
+        </p:nvSpPr>
+        <p:spPr>
+          <a:xfrm>
+            <a:off x="3884613" y="0"/>
+            <a:ext cx="2971800" cy="458788"/>
+          </a:xfrm>
+          <a:prstGeom prst="rect">
+            <a:avLst/>
+          </a:prstGeom>
+        </p:spPr>
+        <p:txBody>
+          <a:bodyPr vert="horz" lIns="91440" tIns="45720" rIns="91440" bIns="45720" rtlCol="0"/>
+          <a:lstStyle>
+            <a:lvl1pPr algn="r">
+              <a:defRPr sz="1200"/>
+            </a:lvl1pPr>
+          </a:lstStyle>
+          <a:p>
+            <a:fld id="{2169E673-BEDA-465F-A0AE-876ADD931EF9}" type="datetimeFigureOut">
+              <a:rPr lang="es-ES" smtClean="0"/>
+              <a:t>04/05/2022</a:t>
+            </a:fld>
+            <a:endParaRPr lang="es-ES"/>
+          </a:p>
+        </p:txBody>
+      </p:sp>
+      <p:sp>
+        <p:nvSpPr>
+          <p:cNvPr id="4" name="Slide Image Placeholder 3"/>
+          <p:cNvSpPr>
+            <a:spLocks noGrp="1" noRot="1" noChangeAspect="1"/>
+          </p:cNvSpPr>
+          <p:nvPr>
+            <p:ph type="sldImg" idx="2"/>
+          </p:nvPr>
+        </p:nvSpPr>
+        <p:spPr>
+          <a:xfrm>
+            <a:off x="685800" y="1143000"/>
+            <a:ext cx="5486400" cy="3086100"/>
+          </a:xfrm>
+          <a:prstGeom prst="rect">
+            <a:avLst/>
+          </a:prstGeom>
+          <a:noFill/>
+          <a:ln w="12700">
+            <a:solidFill>
+              <a:prstClr val="black"/>
+            </a:solidFill>
+          </a:ln>
+        </p:spPr>
+        <p:txBody>
+          <a:bodyPr vert="horz" lIns="91440" tIns="45720" rIns="91440" bIns="45720" rtlCol="0" anchor="ctr"/>
+          <a:lstStyle/>
+          <a:p>
+            <a:endParaRPr lang="es-ES"/>
+          </a:p>
+        </p:txBody>
+      </p:sp>
+      <p:sp>
+        <p:nvSpPr>
+          <p:cNvPr id="5" name="Notes Placeholder 4"/>
+          <p:cNvSpPr>
+            <a:spLocks noGrp="1"/>
+          </p:cNvSpPr>
+          <p:nvPr>
+            <p:ph type="body" sz="quarter" idx="3"/>
+          </p:nvPr>
+        </p:nvSpPr>
+        <p:spPr>
+          <a:xfrm>
+            <a:off x="685800" y="4400550"/>
+            <a:ext cx="5486400" cy="3600450"/>
+          </a:xfrm>
+          <a:prstGeom prst="rect">
+            <a:avLst/>
+          </a:prstGeom>
+        </p:spPr>
+        <p:txBody>
+          <a:bodyPr vert="horz" lIns="91440" tIns="45720" rIns="91440" bIns="45720" rtlCol="0"/>
+          <a:lstStyle/>
+          <a:p>
+            <a:pPr lvl="0"/>
+            <a:r>
+              <a:rPr lang="en-US"/>
+              <a:t>Click to edit Master text styles</a:t>
+            </a:r>
+          </a:p>
+          <a:p>
+            <a:pPr lvl="1"/>
+            <a:r>
+              <a:rPr lang="en-US"/>
+              <a:t>Second level</a:t>
+            </a:r>
+          </a:p>
+          <a:p>
+            <a:pPr lvl="2"/>
+            <a:r>
+              <a:rPr lang="en-US"/>
+              <a:t>Third level</a:t>
+            </a:r>
+          </a:p>
+          <a:p>
+            <a:pPr lvl="3"/>
+            <a:r>
+              <a:rPr lang="en-US"/>
+              <a:t>Fourth level</a:t>
+            </a:r>
+          </a:p>
+          <a:p>
+            <a:pPr lvl="4"/>
+            <a:r>
+              <a:rPr lang="en-US"/>
+              <a:t>Fifth level</a:t>
+            </a:r>
+            <a:endParaRPr lang="es-ES"/>
+          </a:p>
+        </p:txBody>
+      </p:sp>
+      <p:sp>
+        <p:nvSpPr>
+          <p:cNvPr id="6" name="Footer Placeholder 5"/>
+          <p:cNvSpPr>
+            <a:spLocks noGrp="1"/>
+          </p:cNvSpPr>
+          <p:nvPr>
+            <p:ph type="ftr" sz="quarter" idx="4"/>
+          </p:nvPr>
+        </p:nvSpPr>
+        <p:spPr>
+          <a:xfrm>
+            <a:off x="0" y="8685213"/>
+            <a:ext cx="2971800" cy="458787"/>
+          </a:xfrm>
+          <a:prstGeom prst="rect">
+            <a:avLst/>
+          </a:prstGeom>
+        </p:spPr>
+        <p:txBody>
+          <a:bodyPr vert="horz" lIns="91440" tIns="45720" rIns="91440" bIns="45720" rtlCol="0" anchor="b"/>
+          <a:lstStyle>
+            <a:lvl1pPr algn="l">
+              <a:defRPr sz="1200"/>
+            </a:lvl1pPr>
+          </a:lstStyle>
+          <a:p>
+            <a:endParaRPr lang="es-ES"/>
+          </a:p>
+        </p:txBody>
+      </p:sp>
+      <p:sp>
+        <p:nvSpPr>
+          <p:cNvPr id="7" name="Slide Number Placeholder 6"/>
+          <p:cNvSpPr>
+            <a:spLocks noGrp="1"/>
+          </p:cNvSpPr>
+          <p:nvPr>
+            <p:ph type="sldNum" sz="quarter" idx="5"/>
+          </p:nvPr>
+        </p:nvSpPr>
+        <p:spPr>
+          <a:xfrm>
+            <a:off x="3884613" y="8685213"/>
+            <a:ext cx="2971800" cy="458787"/>
+          </a:xfrm>
+          <a:prstGeom prst="rect">
+            <a:avLst/>
+          </a:prstGeom>
+        </p:spPr>
+        <p:txBody>
+          <a:bodyPr vert="horz" lIns="91440" tIns="45720" rIns="91440" bIns="45720" rtlCol="0" anchor="b"/>
+          <a:lstStyle>
+            <a:lvl1pPr algn="r">
+              <a:defRPr sz="1200"/>
+            </a:lvl1pPr>
+          </a:lstStyle>
+          <a:p>
+            <a:fld id="{EADE6788-E2D9-4AFB-8212-408E105E38B8}" type="slidenum">
+              <a:rPr lang="es-ES" smtClean="0"/>
+              <a:t>‹#›</a:t>
+            </a:fld>
+            <a:endParaRPr lang="es-ES"/>
+          </a:p>
+        </p:txBody>
+      </p:sp>
+    </p:spTree>
+    <p:extLst>
+      <p:ext uri="{BB962C8B-B14F-4D97-AF65-F5344CB8AC3E}">
+        <p14:creationId xmlns:p14="http://schemas.microsoft.com/office/powerpoint/2010/main" val="278931757"/>
+      </p:ext>
+    </p:extLst>
+  </p:cSld>
+  <p:clrMap bg1="lt1" tx1="dk1" bg2="lt2" tx2="dk2" accent1="accent1" accent2="accent2" accent3="accent3" accent4="accent4" accent5="accent5" accent6="accent6" hlink="hlink" folHlink="folHlink"/>
+  <p:notesStyle>
+    <a:lvl1pPr marL="0" algn="l" defTabSz="914400" rtl="0" eaLnBrk="1" latinLnBrk="0" hangingPunct="1">
+      <a:defRPr sz="1200" kern="1200">
+        <a:solidFill>
+          <a:schemeClr val="tx1"/>
+        </a:solidFill>
+        <a:latin typeface="+mn-lt"/>
+        <a:ea typeface="+mn-ea"/>
+        <a:cs typeface="+mn-cs"/>
+      </a:defRPr>
+    </a:lvl1pPr>
+    <a:lvl2pPr marL="457200" algn="l" defTabSz="914400" rtl="0" eaLnBrk="1" latinLnBrk="0" hangingPunct="1">
+      <a:defRPr sz="1200" kern="1200">
+        <a:solidFill>
+          <a:schemeClr val="tx1"/>
+        </a:solidFill>
+        <a:latin typeface="+mn-lt"/>
+        <a:ea typeface="+mn-ea"/>
+        <a:cs typeface="+mn-cs"/>
+      </a:defRPr>
+    </a:lvl2pPr>
+    <a:lvl3pPr marL="914400" algn="l" defTabSz="914400" rtl="0" eaLnBrk="1" latinLnBrk="0" hangingPunct="1">
+      <a:defRPr sz="1200" kern="1200">
+        <a:solidFill>
+          <a:schemeClr val="tx1"/>
+        </a:solidFill>
+        <a:latin typeface="+mn-lt"/>
+        <a:ea typeface="+mn-ea"/>
+        <a:cs typeface="+mn-cs"/>
+      </a:defRPr>
+    </a:lvl3pPr>
+    <a:lvl4pPr marL="1371600" algn="l" defTabSz="914400" rtl="0" eaLnBrk="1" latinLnBrk="0" hangingPunct="1">
+      <a:defRPr sz="1200" kern="1200">
+        <a:solidFill>
+          <a:schemeClr val="tx1"/>
+        </a:solidFill>
+        <a:latin typeface="+mn-lt"/>
+        <a:ea typeface="+mn-ea"/>
+        <a:cs typeface="+mn-cs"/>
+      </a:defRPr>
+    </a:lvl4pPr>
+    <a:lvl5pPr marL="1828800" algn="l" defTabSz="914400" rtl="0" eaLnBrk="1" latinLnBrk="0" hangingPunct="1">
+      <a:defRPr sz="1200" kern="1200">
+        <a:solidFill>
+          <a:schemeClr val="tx1"/>
+        </a:solidFill>
+        <a:latin typeface="+mn-lt"/>
+        <a:ea typeface="+mn-ea"/>
+        <a:cs typeface="+mn-cs"/>
+      </a:defRPr>
+    </a:lvl5pPr>
+    <a:lvl6pPr marL="2286000" algn="l" defTabSz="914400" rtl="0" eaLnBrk="1" latinLnBrk="0" hangingPunct="1">
+      <a:defRPr sz="1200" kern="1200">
+        <a:solidFill>
+          <a:schemeClr val="tx1"/>
+        </a:solidFill>
+        <a:latin typeface="+mn-lt"/>
+        <a:ea typeface="+mn-ea"/>
+        <a:cs typeface="+mn-cs"/>
+      </a:defRPr>
+    </a:lvl6pPr>
+    <a:lvl7pPr marL="2743200" algn="l" defTabSz="914400" rtl="0" eaLnBrk="1" latinLnBrk="0" hangingPunct="1">
+      <a:defRPr sz="1200" kern="1200">
+        <a:solidFill>
+          <a:schemeClr val="tx1"/>
+        </a:solidFill>
+        <a:latin typeface="+mn-lt"/>
+        <a:ea typeface="+mn-ea"/>
+        <a:cs typeface="+mn-cs"/>
+      </a:defRPr>
+    </a:lvl7pPr>
+    <a:lvl8pPr marL="3200400" algn="l" defTabSz="914400" rtl="0" eaLnBrk="1" latinLnBrk="0" hangingPunct="1">
+      <a:defRPr sz="1200" kern="1200">
+        <a:solidFill>
+          <a:schemeClr val="tx1"/>
+        </a:solidFill>
+        <a:latin typeface="+mn-lt"/>
+        <a:ea typeface="+mn-ea"/>
+        <a:cs typeface="+mn-cs"/>
+      </a:defRPr>
+    </a:lvl8pPr>
+    <a:lvl9pPr marL="3657600" algn="l" defTabSz="914400" rtl="0" eaLnBrk="1" latinLnBrk="0" hangingPunct="1">
+      <a:defRPr sz="1200" kern="1200">
+        <a:solidFill>
+          <a:schemeClr val="tx1"/>
+        </a:solidFill>
+        <a:latin typeface="+mn-lt"/>
+        <a:ea typeface="+mn-ea"/>
+        <a:cs typeface="+mn-cs"/>
+      </a:defRPr>
+    </a:lvl9pPr>
+  </p:notesStyle>
+</p:notesMaster>
+</file>
+
+<file path=ppt/notesSlides/notesSlide1.xml><?xml version="1.0" encoding="utf-8"?>
+<p:notes xmlns:a="http://schemas.openxmlformats.org/drawingml/2006/main" xmlns:r="http://schemas.openxmlformats.org/officeDocument/2006/relationships" xmlns:p="http://schemas.openxmlformats.org/presentationml/2006/main">
+  <p:cSld>
+    <p:spTree>
+      <p:nvGrpSpPr>
+        <p:cNvPr id="1" name=""/>
+        <p:cNvGrpSpPr/>
+        <p:nvPr/>
+      </p:nvGrpSpPr>
+      <p:grpSpPr>
+        <a:xfrm>
+          <a:off x="0" y="0"/>
+          <a:ext cx="0" cy="0"/>
+          <a:chOff x="0" y="0"/>
+          <a:chExt cx="0" cy="0"/>
+        </a:xfrm>
+      </p:grpSpPr>
+      <p:sp>
+        <p:nvSpPr>
+          <p:cNvPr id="2" name="Slide Image Placeholder 1"/>
+          <p:cNvSpPr>
+            <a:spLocks noGrp="1" noRot="1" noChangeAspect="1"/>
+          </p:cNvSpPr>
+          <p:nvPr>
+            <p:ph type="sldImg"/>
+          </p:nvPr>
+        </p:nvSpPr>
+        <p:spPr/>
+      </p:sp>
+      <p:sp>
+        <p:nvSpPr>
+          <p:cNvPr id="3" name="Notes Placeholder 2"/>
+          <p:cNvSpPr>
+            <a:spLocks noGrp="1"/>
+          </p:cNvSpPr>
+          <p:nvPr>
+            <p:ph type="body" idx="1"/>
+          </p:nvPr>
+        </p:nvSpPr>
+        <p:spPr/>
+        <p:txBody>
+          <a:bodyPr/>
+          <a:lstStyle/>
+          <a:p>
+            <a:r>
+              <a:rPr lang="en-US" dirty="0"/>
+              <a:t>We recommend entering presentation mode.</a:t>
+            </a:r>
+            <a:endParaRPr lang="es-ES" dirty="0"/>
+          </a:p>
+        </p:txBody>
+      </p:sp>
+      <p:sp>
+        <p:nvSpPr>
+          <p:cNvPr id="4" name="Slide Number Placeholder 3"/>
+          <p:cNvSpPr>
+            <a:spLocks noGrp="1"/>
+          </p:cNvSpPr>
+          <p:nvPr>
+            <p:ph type="sldNum" sz="quarter" idx="5"/>
+          </p:nvPr>
+        </p:nvSpPr>
+        <p:spPr/>
+        <p:txBody>
+          <a:bodyPr/>
+          <a:lstStyle/>
+          <a:p>
+            <a:fld id="{EADE6788-E2D9-4AFB-8212-408E105E38B8}" type="slidenum">
+              <a:rPr lang="es-ES" smtClean="0"/>
+              <a:t>1</a:t>
+            </a:fld>
+            <a:endParaRPr lang="es-ES"/>
+          </a:p>
+        </p:txBody>
+      </p:sp>
+    </p:spTree>
+    <p:extLst>
+      <p:ext uri="{BB962C8B-B14F-4D97-AF65-F5344CB8AC3E}">
+        <p14:creationId xmlns:p14="http://schemas.microsoft.com/office/powerpoint/2010/main" val="3735857531"/>
+      </p:ext>
+    </p:extLst>
+  </p:cSld>
+  <p:clrMapOvr>
+    <a:masterClrMapping/>
+  </p:clrMapOvr>
+</p:notes>
 </file>
 
 <file path=ppt/slideLayouts/slideLayout1.xml><?xml version="1.0" encoding="utf-8"?>
@@ -323,7 +704,7 @@
           <a:p>
             <a:fld id="{5F35FA53-A65A-4541-AC9B-B5466D5A3C22}" type="datetimeFigureOut">
               <a:rPr lang="es-ES" smtClean="0"/>
-              <a:t>03/05/2022</a:t>
+              <a:t>04/05/2022</a:t>
             </a:fld>
             <a:endParaRPr lang="es-ES"/>
           </a:p>
@@ -523,7 +904,7 @@
           <a:p>
             <a:fld id="{5F35FA53-A65A-4541-AC9B-B5466D5A3C22}" type="datetimeFigureOut">
               <a:rPr lang="es-ES" smtClean="0"/>
-              <a:t>03/05/2022</a:t>
+              <a:t>04/05/2022</a:t>
             </a:fld>
             <a:endParaRPr lang="es-ES"/>
           </a:p>
@@ -733,7 +1114,7 @@
           <a:p>
             <a:fld id="{5F35FA53-A65A-4541-AC9B-B5466D5A3C22}" type="datetimeFigureOut">
               <a:rPr lang="es-ES" smtClean="0"/>
-              <a:t>03/05/2022</a:t>
+              <a:t>04/05/2022</a:t>
             </a:fld>
             <a:endParaRPr lang="es-ES"/>
           </a:p>
@@ -933,7 +1314,7 @@
           <a:p>
             <a:fld id="{5F35FA53-A65A-4541-AC9B-B5466D5A3C22}" type="datetimeFigureOut">
               <a:rPr lang="es-ES" smtClean="0"/>
-              <a:t>03/05/2022</a:t>
+              <a:t>04/05/2022</a:t>
             </a:fld>
             <a:endParaRPr lang="es-ES"/>
           </a:p>
@@ -1209,7 +1590,7 @@
           <a:p>
             <a:fld id="{5F35FA53-A65A-4541-AC9B-B5466D5A3C22}" type="datetimeFigureOut">
               <a:rPr lang="es-ES" smtClean="0"/>
-              <a:t>03/05/2022</a:t>
+              <a:t>04/05/2022</a:t>
             </a:fld>
             <a:endParaRPr lang="es-ES"/>
           </a:p>
@@ -1477,7 +1858,7 @@
           <a:p>
             <a:fld id="{5F35FA53-A65A-4541-AC9B-B5466D5A3C22}" type="datetimeFigureOut">
               <a:rPr lang="es-ES" smtClean="0"/>
-              <a:t>03/05/2022</a:t>
+              <a:t>04/05/2022</a:t>
             </a:fld>
             <a:endParaRPr lang="es-ES"/>
           </a:p>
@@ -1892,7 +2273,7 @@
           <a:p>
             <a:fld id="{5F35FA53-A65A-4541-AC9B-B5466D5A3C22}" type="datetimeFigureOut">
               <a:rPr lang="es-ES" smtClean="0"/>
-              <a:t>03/05/2022</a:t>
+              <a:t>04/05/2022</a:t>
             </a:fld>
             <a:endParaRPr lang="es-ES"/>
           </a:p>
@@ -2034,7 +2415,7 @@
           <a:p>
             <a:fld id="{5F35FA53-A65A-4541-AC9B-B5466D5A3C22}" type="datetimeFigureOut">
               <a:rPr lang="es-ES" smtClean="0"/>
-              <a:t>03/05/2022</a:t>
+              <a:t>04/05/2022</a:t>
             </a:fld>
             <a:endParaRPr lang="es-ES"/>
           </a:p>
@@ -2147,7 +2528,7 @@
           <a:p>
             <a:fld id="{5F35FA53-A65A-4541-AC9B-B5466D5A3C22}" type="datetimeFigureOut">
               <a:rPr lang="es-ES" smtClean="0"/>
-              <a:t>03/05/2022</a:t>
+              <a:t>04/05/2022</a:t>
             </a:fld>
             <a:endParaRPr lang="es-ES"/>
           </a:p>
@@ -2460,7 +2841,7 @@
           <a:p>
             <a:fld id="{5F35FA53-A65A-4541-AC9B-B5466D5A3C22}" type="datetimeFigureOut">
               <a:rPr lang="es-ES" smtClean="0"/>
-              <a:t>03/05/2022</a:t>
+              <a:t>04/05/2022</a:t>
             </a:fld>
             <a:endParaRPr lang="es-ES"/>
           </a:p>
@@ -2749,7 +3130,7 @@
           <a:p>
             <a:fld id="{5F35FA53-A65A-4541-AC9B-B5466D5A3C22}" type="datetimeFigureOut">
               <a:rPr lang="es-ES" smtClean="0"/>
-              <a:t>03/05/2022</a:t>
+              <a:t>04/05/2022</a:t>
             </a:fld>
             <a:endParaRPr lang="es-ES"/>
           </a:p>
@@ -2992,7 +3373,7 @@
           <a:p>
             <a:fld id="{5F35FA53-A65A-4541-AC9B-B5466D5A3C22}" type="datetimeFigureOut">
               <a:rPr lang="es-ES" smtClean="0"/>
-              <a:t>03/05/2022</a:t>
+              <a:t>04/05/2022</a:t>
             </a:fld>
             <a:endParaRPr lang="es-ES"/>
           </a:p>
@@ -3398,6 +3779,279 @@
     <p:bg>
       <p:bgPr>
         <a:blipFill dpi="0" rotWithShape="1">
+          <a:blip r:embed="rId4">
+            <a:lum/>
+          </a:blip>
+          <a:srcRect/>
+          <a:stretch>
+            <a:fillRect/>
+          </a:stretch>
+        </a:blipFill>
+        <a:effectLst/>
+      </p:bgPr>
+    </p:bg>
+    <p:spTree>
+      <p:nvGrpSpPr>
+        <p:cNvPr id="1" name=""/>
+        <p:cNvGrpSpPr/>
+        <p:nvPr/>
+      </p:nvGrpSpPr>
+      <p:grpSpPr>
+        <a:xfrm>
+          <a:off x="0" y="0"/>
+          <a:ext cx="0" cy="0"/>
+          <a:chOff x="0" y="0"/>
+          <a:chExt cx="0" cy="0"/>
+        </a:xfrm>
+      </p:grpSpPr>
+      <p:sp>
+        <p:nvSpPr>
+          <p:cNvPr id="2" name="Title 1">
+            <a:extLst>
+              <a:ext uri="{FF2B5EF4-FFF2-40B4-BE49-F238E27FC236}">
+                <a16:creationId xmlns:a16="http://schemas.microsoft.com/office/drawing/2014/main" id="{3D542409-9C99-F1E1-F695-2276C90724C5}"/>
+              </a:ext>
+            </a:extLst>
+          </p:cNvPr>
+          <p:cNvSpPr>
+            <a:spLocks noGrp="1"/>
+          </p:cNvSpPr>
+          <p:nvPr>
+            <p:ph type="ctrTitle"/>
+          </p:nvPr>
+        </p:nvSpPr>
+        <p:spPr>
+          <a:xfrm>
+            <a:off x="0" y="1065320"/>
+            <a:ext cx="12192000" cy="6631620"/>
+          </a:xfrm>
+        </p:spPr>
+        <p:txBody>
+          <a:bodyPr>
+            <a:prstTxWarp prst="textFadeUp">
+              <a:avLst/>
+            </a:prstTxWarp>
+            <a:normAutofit fontScale="90000"/>
+          </a:bodyPr>
+          <a:lstStyle/>
+          <a:p>
+            <a:r>
+              <a:rPr lang="en-US" sz="10000" dirty="0">
+                <a:solidFill>
+                  <a:schemeClr val="accent4"/>
+                </a:solidFill>
+                <a:latin typeface="Bahnschrift Condensed" panose="020B0502040204020203" pitchFamily="34" charset="0"/>
+              </a:rPr>
+              <a:t>Group Seven</a:t>
+            </a:r>
+            <a:br>
+              <a:rPr lang="en-US" sz="10000" dirty="0">
+                <a:solidFill>
+                  <a:schemeClr val="accent4"/>
+                </a:solidFill>
+                <a:latin typeface="Bahnschrift Condensed" panose="020B0502040204020203" pitchFamily="34" charset="0"/>
+              </a:rPr>
+            </a:br>
+            <a:r>
+              <a:rPr lang="en-US" sz="9600" dirty="0">
+                <a:solidFill>
+                  <a:schemeClr val="accent4"/>
+                </a:solidFill>
+                <a:latin typeface="Bahnschrift Condensed" panose="020B0502040204020203" pitchFamily="34" charset="0"/>
+              </a:rPr>
+              <a:t>Imperial Credit Predictions</a:t>
+            </a:r>
+            <a:br>
+              <a:rPr lang="en-US" sz="9600" dirty="0">
+                <a:solidFill>
+                  <a:schemeClr val="accent4"/>
+                </a:solidFill>
+                <a:latin typeface="Bahnschrift Condensed" panose="020B0502040204020203" pitchFamily="34" charset="0"/>
+              </a:rPr>
+            </a:br>
+            <a:r>
+              <a:rPr lang="en-US" sz="9600" dirty="0">
+                <a:solidFill>
+                  <a:schemeClr val="accent4"/>
+                </a:solidFill>
+                <a:latin typeface="Bahnschrift Condensed" panose="020B0502040204020203" pitchFamily="34" charset="0"/>
+              </a:rPr>
+              <a:t>by: Savannah Jones, Megan </a:t>
+            </a:r>
+            <a:r>
+              <a:rPr lang="en-US" sz="9600" dirty="0" err="1">
+                <a:solidFill>
+                  <a:schemeClr val="accent4"/>
+                </a:solidFill>
+                <a:latin typeface="Bahnschrift Condensed" panose="020B0502040204020203" pitchFamily="34" charset="0"/>
+              </a:rPr>
+              <a:t>Toale</a:t>
+            </a:r>
+            <a:r>
+              <a:rPr lang="en-US" sz="9600" dirty="0">
+                <a:solidFill>
+                  <a:schemeClr val="accent4"/>
+                </a:solidFill>
+                <a:latin typeface="Bahnschrift Condensed" panose="020B0502040204020203" pitchFamily="34" charset="0"/>
+              </a:rPr>
+              <a:t>, Gabby Doty, Katie Bardwell</a:t>
+            </a:r>
+            <a:br>
+              <a:rPr lang="es-ES" sz="9600" dirty="0">
+                <a:solidFill>
+                  <a:schemeClr val="accent4"/>
+                </a:solidFill>
+                <a:latin typeface="Bahnschrift Condensed" panose="020B0502040204020203" pitchFamily="34" charset="0"/>
+              </a:rPr>
+            </a:br>
+            <a:endParaRPr lang="es-ES" sz="10000" dirty="0">
+              <a:solidFill>
+                <a:schemeClr val="accent4"/>
+              </a:solidFill>
+              <a:latin typeface="Bahnschrift Condensed" panose="020B0502040204020203" pitchFamily="34" charset="0"/>
+            </a:endParaRPr>
+          </a:p>
+        </p:txBody>
+      </p:sp>
+      <p:pic>
+        <p:nvPicPr>
+          <p:cNvPr id="4" name="StarWarsThemeSongByJohnWilliams_vbr">
+            <a:hlinkClick r:id="" action="ppaction://media"/>
+            <a:extLst>
+              <a:ext uri="{FF2B5EF4-FFF2-40B4-BE49-F238E27FC236}">
+                <a16:creationId xmlns:a16="http://schemas.microsoft.com/office/drawing/2014/main" id="{6C3C884D-9D63-BBF3-25BA-9FB363DB7891}"/>
+              </a:ext>
+            </a:extLst>
+          </p:cNvPr>
+          <p:cNvPicPr>
+            <a:picLocks noRot="1" noChangeAspect="1"/>
+          </p:cNvPicPr>
+          <p:nvPr>
+            <a:audioFile r:link="rId1"/>
+          </p:nvPr>
+        </p:nvPicPr>
+        <p:blipFill>
+          <a:blip r:embed="rId5"/>
+          <a:stretch>
+            <a:fillRect/>
+          </a:stretch>
+        </p:blipFill>
+        <p:spPr>
+          <a:xfrm>
+            <a:off x="11622011" y="6220688"/>
+            <a:ext cx="487363" cy="487363"/>
+          </a:xfrm>
+          <a:prstGeom prst="rect">
+            <a:avLst/>
+          </a:prstGeom>
+        </p:spPr>
+      </p:pic>
+    </p:spTree>
+    <p:extLst>
+      <p:ext uri="{BB962C8B-B14F-4D97-AF65-F5344CB8AC3E}">
+        <p14:creationId xmlns:p14="http://schemas.microsoft.com/office/powerpoint/2010/main" val="2036080236"/>
+      </p:ext>
+    </p:extLst>
+  </p:cSld>
+  <p:clrMapOvr>
+    <a:masterClrMapping/>
+  </p:clrMapOvr>
+  <p:timing>
+    <p:tnLst>
+      <p:par>
+        <p:cTn id="1" dur="indefinite" restart="never" nodeType="tmRoot">
+          <p:childTnLst>
+            <p:seq concurrent="1" nextAc="seek">
+              <p:cTn id="2" dur="indefinite" nodeType="mainSeq">
+                <p:childTnLst>
+                  <p:par>
+                    <p:cTn id="3" fill="hold">
+                      <p:stCondLst>
+                        <p:cond delay="indefinite"/>
+                        <p:cond evt="onBegin" delay="0">
+                          <p:tn val="2"/>
+                        </p:cond>
+                      </p:stCondLst>
+                      <p:childTnLst>
+                        <p:par>
+                          <p:cTn id="4" fill="hold">
+                            <p:stCondLst>
+                              <p:cond delay="0"/>
+                            </p:stCondLst>
+                            <p:childTnLst>
+                              <p:par>
+                                <p:cTn id="5" presetID="1" presetClass="mediacall" presetSubtype="0" fill="hold" nodeType="afterEffect">
+                                  <p:stCondLst>
+                                    <p:cond delay="0"/>
+                                  </p:stCondLst>
+                                  <p:childTnLst>
+                                    <p:cmd type="call" cmd="playFrom(0.0)">
+                                      <p:cBhvr>
+                                        <p:cTn id="6" dur="1" fill="hold"/>
+                                        <p:tgtEl>
+                                          <p:spTgt spid="4"/>
+                                        </p:tgtEl>
+                                      </p:cBhvr>
+                                    </p:cmd>
+                                  </p:childTnLst>
+                                </p:cTn>
+                              </p:par>
+                            </p:childTnLst>
+                          </p:cTn>
+                        </p:par>
+                      </p:childTnLst>
+                    </p:cTn>
+                  </p:par>
+                </p:childTnLst>
+              </p:cTn>
+              <p:prevCondLst>
+                <p:cond evt="onPrev" delay="0">
+                  <p:tgtEl>
+                    <p:sldTgt/>
+                  </p:tgtEl>
+                </p:cond>
+              </p:prevCondLst>
+              <p:nextCondLst>
+                <p:cond evt="onNext" delay="0">
+                  <p:tgtEl>
+                    <p:sldTgt/>
+                  </p:tgtEl>
+                </p:cond>
+              </p:nextCondLst>
+            </p:seq>
+            <p:audio>
+              <p:cMediaNode vol="80000" numSld="999" showWhenStopped="0">
+                <p:cTn id="7" repeatCount="indefinite" fill="hold" display="0">
+                  <p:stCondLst>
+                    <p:cond delay="indefinite"/>
+                  </p:stCondLst>
+                  <p:endCondLst>
+                    <p:cond evt="onStopAudio" delay="0">
+                      <p:tgtEl>
+                        <p:sldTgt/>
+                      </p:tgtEl>
+                    </p:cond>
+                  </p:endCondLst>
+                </p:cTn>
+                <p:tgtEl>
+                  <p:spTgt spid="4"/>
+                </p:tgtEl>
+              </p:cMediaNode>
+            </p:audio>
+          </p:childTnLst>
+        </p:cTn>
+      </p:par>
+    </p:tnLst>
+  </p:timing>
+</p:sld>
+</file>
+
+<file path=ppt/slides/slide2.xml><?xml version="1.0" encoding="utf-8"?>
+<p:sld xmlns:a="http://schemas.openxmlformats.org/drawingml/2006/main" xmlns:r="http://schemas.openxmlformats.org/officeDocument/2006/relationships" xmlns:p="http://schemas.openxmlformats.org/presentationml/2006/main">
+  <p:cSld>
+    <p:bg>
+      <p:bgPr>
+        <a:blipFill dpi="0" rotWithShape="1">
           <a:blip r:embed="rId2">
             <a:lum/>
           </a:blip>
@@ -3423,119 +4077,203 @@
           <a:chExt cx="0" cy="0"/>
         </a:xfrm>
       </p:grpSpPr>
-      <p:sp>
-        <p:nvSpPr>
-          <p:cNvPr id="2" name="Title 1">
-            <a:extLst>
-              <a:ext uri="{FF2B5EF4-FFF2-40B4-BE49-F238E27FC236}">
-                <a16:creationId xmlns:a16="http://schemas.microsoft.com/office/drawing/2014/main" id="{3D542409-9C99-F1E1-F695-2276C90724C5}"/>
-              </a:ext>
-            </a:extLst>
-          </p:cNvPr>
-          <p:cNvSpPr>
-            <a:spLocks noGrp="1"/>
-          </p:cNvSpPr>
-          <p:nvPr>
-            <p:ph type="ctrTitle"/>
-          </p:nvPr>
-        </p:nvSpPr>
+      <p:pic>
+        <p:nvPicPr>
+          <p:cNvPr id="4" name="Picture 3" descr="Graphical user interface&#10;&#10;Description automatically generated with medium confidence">
+            <a:extLst>
+              <a:ext uri="{FF2B5EF4-FFF2-40B4-BE49-F238E27FC236}">
+                <a16:creationId xmlns:a16="http://schemas.microsoft.com/office/drawing/2014/main" id="{5ACF210B-759B-B8F9-7A5E-7808818E1F8A}"/>
+              </a:ext>
+            </a:extLst>
+          </p:cNvPr>
+          <p:cNvPicPr>
+            <a:picLocks noChangeAspect="1"/>
+          </p:cNvPicPr>
+          <p:nvPr/>
+        </p:nvPicPr>
+        <p:blipFill>
+          <a:blip r:embed="rId3">
+            <a:extLst>
+              <a:ext uri="{28A0092B-C50C-407E-A947-70E740481C1C}">
+                <a14:useLocalDpi xmlns:a14="http://schemas.microsoft.com/office/drawing/2010/main" val="0"/>
+              </a:ext>
+            </a:extLst>
+          </a:blip>
+          <a:stretch>
+            <a:fillRect/>
+          </a:stretch>
+        </p:blipFill>
         <p:spPr>
           <a:xfrm>
-            <a:off x="764959" y="1074198"/>
-            <a:ext cx="10662082" cy="5783802"/>
+            <a:off x="283429" y="1117871"/>
+            <a:ext cx="6590794" cy="4622258"/>
           </a:xfrm>
+          <a:prstGeom prst="rect">
+            <a:avLst/>
+          </a:prstGeom>
         </p:spPr>
-        <p:txBody>
-          <a:bodyPr>
-            <a:prstTxWarp prst="textFadeUp">
-              <a:avLst/>
-            </a:prstTxWarp>
-            <a:normAutofit fontScale="90000"/>
+      </p:pic>
+      <p:sp>
+        <p:nvSpPr>
+          <p:cNvPr id="5" name="TextBox 4">
+            <a:extLst>
+              <a:ext uri="{FF2B5EF4-FFF2-40B4-BE49-F238E27FC236}">
+                <a16:creationId xmlns:a16="http://schemas.microsoft.com/office/drawing/2014/main" id="{8E37FD45-879A-574C-269A-832BBBD3B6D1}"/>
+              </a:ext>
+            </a:extLst>
+          </p:cNvPr>
+          <p:cNvSpPr txBox="1"/>
+          <p:nvPr/>
+        </p:nvSpPr>
+        <p:spPr>
+          <a:xfrm>
+            <a:off x="6874223" y="1001444"/>
+            <a:ext cx="5317777" cy="4855112"/>
+          </a:xfrm>
+          <a:prstGeom prst="rect">
+            <a:avLst/>
+          </a:prstGeom>
+          <a:noFill/>
+        </p:spPr>
+        <p:txBody>
+          <a:bodyPr wrap="square">
+            <a:spAutoFit/>
           </a:bodyPr>
           <a:lstStyle/>
           <a:p>
-            <a:r>
-              <a:rPr lang="en-US" sz="10000" dirty="0">
+            <a:pPr marL="571500" indent="-571500">
+              <a:lnSpc>
+                <a:spcPct val="200000"/>
+              </a:lnSpc>
+              <a:buSzPct val="200000"/>
+              <a:buBlip>
+                <a:blip r:embed="rId4"/>
+              </a:buBlip>
+            </a:pPr>
+            <a:r>
+              <a:rPr lang="en-US" sz="3200" dirty="0">
                 <a:solidFill>
                   <a:schemeClr val="accent4"/>
                 </a:solidFill>
                 <a:latin typeface="Bahnschrift Condensed" panose="020B0502040204020203" pitchFamily="34" charset="0"/>
               </a:rPr>
-              <a:t>Group Seven</a:t>
-            </a:r>
-            <a:br>
-              <a:rPr lang="en-US" sz="10000" dirty="0">
+              <a:t>Displays historical credit value</a:t>
+            </a:r>
+            <a:endParaRPr lang="es-ES" sz="3200" dirty="0">
+              <a:solidFill>
+                <a:schemeClr val="accent4"/>
+              </a:solidFill>
+              <a:latin typeface="Bahnschrift Condensed" panose="020B0502040204020203" pitchFamily="34" charset="0"/>
+            </a:endParaRPr>
+          </a:p>
+          <a:p>
+            <a:pPr marL="571500" indent="-571500">
+              <a:lnSpc>
+                <a:spcPct val="200000"/>
+              </a:lnSpc>
+              <a:buSzPct val="200000"/>
+              <a:buBlip>
+                <a:blip r:embed="rId4"/>
+              </a:buBlip>
+            </a:pPr>
+            <a:r>
+              <a:rPr lang="es-ES" sz="3200" dirty="0" err="1">
                 <a:solidFill>
                   <a:schemeClr val="accent4"/>
                 </a:solidFill>
                 <a:latin typeface="Bahnschrift Condensed" panose="020B0502040204020203" pitchFamily="34" charset="0"/>
               </a:rPr>
-            </a:br>
-            <a:r>
-              <a:rPr lang="en-US" sz="9600" dirty="0">
+              <a:t>Displays</a:t>
+            </a:r>
+            <a:r>
+              <a:rPr lang="es-ES" sz="3200" dirty="0">
                 <a:solidFill>
                   <a:schemeClr val="accent4"/>
                 </a:solidFill>
                 <a:latin typeface="Bahnschrift Condensed" panose="020B0502040204020203" pitchFamily="34" charset="0"/>
               </a:rPr>
-              <a:t>Imperial Credit Predictions</a:t>
-            </a:r>
-            <a:br>
-              <a:rPr lang="en-US" sz="9600" dirty="0">
+              <a:t> </a:t>
+            </a:r>
+            <a:r>
+              <a:rPr lang="es-ES" sz="3200" dirty="0" err="1">
                 <a:solidFill>
                   <a:schemeClr val="accent4"/>
                 </a:solidFill>
                 <a:latin typeface="Bahnschrift Condensed" panose="020B0502040204020203" pitchFamily="34" charset="0"/>
               </a:rPr>
-            </a:br>
-            <a:r>
-              <a:rPr lang="en-US" sz="9600" dirty="0">
+              <a:t>upward</a:t>
+            </a:r>
+            <a:r>
+              <a:rPr lang="es-ES" sz="3200" dirty="0">
                 <a:solidFill>
                   <a:schemeClr val="accent4"/>
                 </a:solidFill>
                 <a:latin typeface="Bahnschrift Condensed" panose="020B0502040204020203" pitchFamily="34" charset="0"/>
               </a:rPr>
-              <a:t>by: Savannah Jones, Megan </a:t>
-            </a:r>
-            <a:r>
-              <a:rPr lang="en-US" sz="9600" dirty="0" err="1">
+              <a:t> </a:t>
+            </a:r>
+            <a:r>
+              <a:rPr lang="es-ES" sz="3200" dirty="0" err="1">
                 <a:solidFill>
                   <a:schemeClr val="accent4"/>
                 </a:solidFill>
                 <a:latin typeface="Bahnschrift Condensed" panose="020B0502040204020203" pitchFamily="34" charset="0"/>
               </a:rPr>
-              <a:t>Toale</a:t>
-            </a:r>
-            <a:r>
-              <a:rPr lang="en-US" sz="9600" dirty="0">
+              <a:t>trend</a:t>
+            </a:r>
+            <a:endParaRPr lang="es-ES" sz="3200" dirty="0">
+              <a:solidFill>
+                <a:schemeClr val="accent4"/>
+              </a:solidFill>
+              <a:latin typeface="Bahnschrift Condensed" panose="020B0502040204020203" pitchFamily="34" charset="0"/>
+            </a:endParaRPr>
+          </a:p>
+          <a:p>
+            <a:pPr marL="571500" indent="-571500">
+              <a:lnSpc>
+                <a:spcPct val="200000"/>
+              </a:lnSpc>
+              <a:buSzPct val="200000"/>
+              <a:buBlip>
+                <a:blip r:embed="rId4"/>
+              </a:buBlip>
+            </a:pPr>
+            <a:r>
+              <a:rPr lang="en-US" sz="3200" dirty="0">
                 <a:solidFill>
                   <a:schemeClr val="accent4"/>
                 </a:solidFill>
                 <a:latin typeface="Bahnschrift Condensed" panose="020B0502040204020203" pitchFamily="34" charset="0"/>
               </a:rPr>
-              <a:t>, Gabby Doty, Katie Bardwell</a:t>
-            </a:r>
-            <a:br>
-              <a:rPr lang="es-ES" sz="9600" dirty="0">
+              <a:t>No seasonal patterns</a:t>
+            </a:r>
+          </a:p>
+          <a:p>
+            <a:pPr marL="1028700" lvl="1" indent="-571500">
+              <a:lnSpc>
+                <a:spcPct val="200000"/>
+              </a:lnSpc>
+              <a:buSzPct val="250000"/>
+              <a:buBlip>
+                <a:blip r:embed="rId5"/>
+              </a:buBlip>
+            </a:pPr>
+            <a:r>
+              <a:rPr lang="en-US" sz="3200" dirty="0">
                 <a:solidFill>
                   <a:schemeClr val="accent4"/>
                 </a:solidFill>
                 <a:latin typeface="Bahnschrift Condensed" panose="020B0502040204020203" pitchFamily="34" charset="0"/>
               </a:rPr>
-            </a:br>
-            <a:endParaRPr lang="es-ES" sz="10000" dirty="0">
-              <a:solidFill>
-                <a:schemeClr val="accent4"/>
-              </a:solidFill>
-              <a:latin typeface="Bahnschrift Condensed" panose="020B0502040204020203" pitchFamily="34" charset="0"/>
-            </a:endParaRPr>
+              <a:t>Predictions have no seasonal guide</a:t>
+            </a:r>
           </a:p>
         </p:txBody>
       </p:sp>
     </p:spTree>
     <p:extLst>
       <p:ext uri="{BB962C8B-B14F-4D97-AF65-F5344CB8AC3E}">
-        <p14:creationId xmlns:p14="http://schemas.microsoft.com/office/powerpoint/2010/main" val="2036080236"/>
+        <p14:creationId xmlns:p14="http://schemas.microsoft.com/office/powerpoint/2010/main" val="758067480"/>
       </p:ext>
     </p:extLst>
   </p:cSld>
@@ -3545,9 +4283,23 @@
 </p:sld>
 </file>
 
-<file path=ppt/slides/slide2.xml><?xml version="1.0" encoding="utf-8"?>
+<file path=ppt/slides/slide3.xml><?xml version="1.0" encoding="utf-8"?>
 <p:sld xmlns:a="http://schemas.openxmlformats.org/drawingml/2006/main" xmlns:r="http://schemas.openxmlformats.org/officeDocument/2006/relationships" xmlns:p="http://schemas.openxmlformats.org/presentationml/2006/main">
   <p:cSld>
+    <p:bg>
+      <p:bgPr>
+        <a:blipFill dpi="0" rotWithShape="1">
+          <a:blip r:embed="rId2">
+            <a:lum/>
+          </a:blip>
+          <a:srcRect/>
+          <a:stretch>
+            <a:fillRect/>
+          </a:stretch>
+        </a:blipFill>
+        <a:effectLst/>
+      </p:bgPr>
+    </p:bg>
     <p:spTree>
       <p:nvGrpSpPr>
         <p:cNvPr id="1" name=""/>
@@ -3562,229 +4314,215 @@
           <a:chExt cx="0" cy="0"/>
         </a:xfrm>
       </p:grpSpPr>
-      <p:sp>
-        <p:nvSpPr>
-          <p:cNvPr id="2" name="Title 1">
-            <a:extLst>
-              <a:ext uri="{FF2B5EF4-FFF2-40B4-BE49-F238E27FC236}">
-                <a16:creationId xmlns:a16="http://schemas.microsoft.com/office/drawing/2014/main" id="{DC235536-605F-A1D3-C4BE-28B73FE47E69}"/>
-              </a:ext>
-            </a:extLst>
-          </p:cNvPr>
-          <p:cNvSpPr>
-            <a:spLocks noGrp="1"/>
-          </p:cNvSpPr>
-          <p:nvPr>
-            <p:ph type="title"/>
-          </p:nvPr>
-        </p:nvSpPr>
-        <p:spPr/>
-        <p:txBody>
-          <a:bodyPr/>
-          <a:lstStyle/>
-          <a:p>
-            <a:r>
-              <a:rPr lang="es-ES" dirty="0"/>
-              <a:t>Data</a:t>
-            </a:r>
-          </a:p>
-        </p:txBody>
-      </p:sp>
-      <p:sp>
-        <p:nvSpPr>
-          <p:cNvPr id="3" name="Content Placeholder 2">
-            <a:extLst>
-              <a:ext uri="{FF2B5EF4-FFF2-40B4-BE49-F238E27FC236}">
-                <a16:creationId xmlns:a16="http://schemas.microsoft.com/office/drawing/2014/main" id="{F25F98D9-DF82-D305-C7AE-E49B7AF85E5A}"/>
-              </a:ext>
-            </a:extLst>
-          </p:cNvPr>
-          <p:cNvSpPr>
-            <a:spLocks noGrp="1"/>
-          </p:cNvSpPr>
-          <p:nvPr>
-            <p:ph idx="1"/>
-          </p:nvPr>
-        </p:nvSpPr>
-        <p:spPr/>
-        <p:txBody>
-          <a:bodyPr/>
-          <a:lstStyle/>
-          <a:p>
-            <a:endParaRPr lang="es-ES" dirty="0"/>
+      <p:pic>
+        <p:nvPicPr>
+          <p:cNvPr id="4" name="Picture 3" descr="Graphical user interface, chart&#10;&#10;Description automatically generated">
+            <a:extLst>
+              <a:ext uri="{FF2B5EF4-FFF2-40B4-BE49-F238E27FC236}">
+                <a16:creationId xmlns:a16="http://schemas.microsoft.com/office/drawing/2014/main" id="{674C66D8-50D3-1282-8FC6-80D62F5AD366}"/>
+              </a:ext>
+            </a:extLst>
+          </p:cNvPr>
+          <p:cNvPicPr>
+            <a:picLocks noChangeAspect="1"/>
+          </p:cNvPicPr>
+          <p:nvPr/>
+        </p:nvPicPr>
+        <p:blipFill>
+          <a:blip r:embed="rId3">
+            <a:extLst>
+              <a:ext uri="{28A0092B-C50C-407E-A947-70E740481C1C}">
+                <a14:useLocalDpi xmlns:a14="http://schemas.microsoft.com/office/drawing/2010/main" val="0"/>
+              </a:ext>
+            </a:extLst>
+          </a:blip>
+          <a:stretch>
+            <a:fillRect/>
+          </a:stretch>
+        </p:blipFill>
+        <p:spPr>
+          <a:xfrm>
+            <a:off x="174625" y="1222948"/>
+            <a:ext cx="6350913" cy="4412103"/>
+          </a:xfrm>
+          <a:prstGeom prst="rect">
+            <a:avLst/>
+          </a:prstGeom>
+        </p:spPr>
+      </p:pic>
+      <p:sp>
+        <p:nvSpPr>
+          <p:cNvPr id="8" name="TextBox 7">
+            <a:extLst>
+              <a:ext uri="{FF2B5EF4-FFF2-40B4-BE49-F238E27FC236}">
+                <a16:creationId xmlns:a16="http://schemas.microsoft.com/office/drawing/2014/main" id="{8E7AD56F-F1B6-1859-3D2C-FC2A4B3CB598}"/>
+              </a:ext>
+            </a:extLst>
+          </p:cNvPr>
+          <p:cNvSpPr txBox="1"/>
+          <p:nvPr/>
+        </p:nvSpPr>
+        <p:spPr>
+          <a:xfrm>
+            <a:off x="6525538" y="1493885"/>
+            <a:ext cx="5666462" cy="3870227"/>
+          </a:xfrm>
+          <a:prstGeom prst="rect">
+            <a:avLst/>
+          </a:prstGeom>
+          <a:noFill/>
+        </p:spPr>
+        <p:txBody>
+          <a:bodyPr wrap="square" rtlCol="0">
+            <a:spAutoFit/>
+          </a:bodyPr>
+          <a:lstStyle/>
+          <a:p>
+            <a:pPr marL="457200" indent="-457200">
+              <a:lnSpc>
+                <a:spcPct val="200000"/>
+              </a:lnSpc>
+              <a:buSzPct val="200000"/>
+              <a:buBlip>
+                <a:blip r:embed="rId4"/>
+              </a:buBlip>
+            </a:pPr>
+            <a:r>
+              <a:rPr lang="en-US" sz="3200" dirty="0">
+                <a:solidFill>
+                  <a:schemeClr val="accent4"/>
+                </a:solidFill>
+                <a:latin typeface="Bahnschrift Condensed" panose="020B0502040204020203" pitchFamily="34" charset="0"/>
+              </a:rPr>
+              <a:t>Relies heavily on the mean</a:t>
+            </a:r>
+          </a:p>
+          <a:p>
+            <a:pPr marL="914400" lvl="1" indent="-457200">
+              <a:lnSpc>
+                <a:spcPct val="200000"/>
+              </a:lnSpc>
+              <a:buSzPct val="250000"/>
+              <a:buBlip>
+                <a:blip r:embed="rId5"/>
+              </a:buBlip>
+            </a:pPr>
+            <a:r>
+              <a:rPr lang="en-US" sz="3200" dirty="0">
+                <a:solidFill>
+                  <a:schemeClr val="accent4"/>
+                </a:solidFill>
+                <a:latin typeface="Bahnschrift Condensed" panose="020B0502040204020203" pitchFamily="34" charset="0"/>
+              </a:rPr>
+              <a:t>Hence the line is nearly straight </a:t>
+            </a:r>
+          </a:p>
+          <a:p>
+            <a:pPr marL="457200" indent="-457200">
+              <a:lnSpc>
+                <a:spcPct val="200000"/>
+              </a:lnSpc>
+              <a:buSzPct val="200000"/>
+              <a:buBlip>
+                <a:blip r:embed="rId4"/>
+              </a:buBlip>
+            </a:pPr>
+            <a:r>
+              <a:rPr lang="es-ES" sz="3200" dirty="0" err="1">
+                <a:solidFill>
+                  <a:schemeClr val="accent4"/>
+                </a:solidFill>
+                <a:latin typeface="Bahnschrift Condensed" panose="020B0502040204020203" pitchFamily="34" charset="0"/>
+              </a:rPr>
+              <a:t>Lack</a:t>
+            </a:r>
+            <a:r>
+              <a:rPr lang="es-ES" sz="3200" dirty="0">
+                <a:solidFill>
+                  <a:schemeClr val="accent4"/>
+                </a:solidFill>
+                <a:latin typeface="Bahnschrift Condensed" panose="020B0502040204020203" pitchFamily="34" charset="0"/>
+              </a:rPr>
+              <a:t> </a:t>
+            </a:r>
+            <a:r>
+              <a:rPr lang="es-ES" sz="3200" dirty="0" err="1">
+                <a:solidFill>
+                  <a:schemeClr val="accent4"/>
+                </a:solidFill>
+                <a:latin typeface="Bahnschrift Condensed" panose="020B0502040204020203" pitchFamily="34" charset="0"/>
+              </a:rPr>
+              <a:t>of</a:t>
+            </a:r>
+            <a:r>
+              <a:rPr lang="es-ES" sz="3200" dirty="0">
+                <a:solidFill>
+                  <a:schemeClr val="accent4"/>
+                </a:solidFill>
+                <a:latin typeface="Bahnschrift Condensed" panose="020B0502040204020203" pitchFamily="34" charset="0"/>
+              </a:rPr>
+              <a:t> </a:t>
+            </a:r>
+            <a:r>
+              <a:rPr lang="es-ES" sz="3200" dirty="0" err="1">
+                <a:solidFill>
+                  <a:schemeClr val="accent4"/>
+                </a:solidFill>
+                <a:latin typeface="Bahnschrift Condensed" panose="020B0502040204020203" pitchFamily="34" charset="0"/>
+              </a:rPr>
+              <a:t>seasonal</a:t>
+            </a:r>
+            <a:r>
+              <a:rPr lang="es-ES" sz="3200" dirty="0">
+                <a:solidFill>
+                  <a:schemeClr val="accent4"/>
+                </a:solidFill>
+                <a:latin typeface="Bahnschrift Condensed" panose="020B0502040204020203" pitchFamily="34" charset="0"/>
+              </a:rPr>
+              <a:t> </a:t>
+            </a:r>
+            <a:r>
+              <a:rPr lang="es-ES" sz="3200" dirty="0" err="1">
+                <a:solidFill>
+                  <a:schemeClr val="accent4"/>
+                </a:solidFill>
+                <a:latin typeface="Bahnschrift Condensed" panose="020B0502040204020203" pitchFamily="34" charset="0"/>
+              </a:rPr>
+              <a:t>pattern</a:t>
+            </a:r>
+            <a:endParaRPr lang="es-ES" sz="3200" dirty="0">
+              <a:solidFill>
+                <a:schemeClr val="accent4"/>
+              </a:solidFill>
+              <a:latin typeface="Bahnschrift Condensed" panose="020B0502040204020203" pitchFamily="34" charset="0"/>
+            </a:endParaRPr>
+          </a:p>
+          <a:p>
+            <a:pPr marL="914400" lvl="1" indent="-457200">
+              <a:lnSpc>
+                <a:spcPct val="200000"/>
+              </a:lnSpc>
+              <a:buSzPct val="250000"/>
+              <a:buBlip>
+                <a:blip r:embed="rId5"/>
+              </a:buBlip>
+            </a:pPr>
+            <a:r>
+              <a:rPr lang="en-US" sz="3200" dirty="0">
+                <a:solidFill>
+                  <a:schemeClr val="accent4"/>
+                </a:solidFill>
+                <a:latin typeface="Bahnschrift Condensed" panose="020B0502040204020203" pitchFamily="34" charset="0"/>
+              </a:rPr>
+              <a:t>Inability to predict or trust trend</a:t>
+            </a:r>
           </a:p>
         </p:txBody>
       </p:sp>
     </p:spTree>
     <p:extLst>
       <p:ext uri="{BB962C8B-B14F-4D97-AF65-F5344CB8AC3E}">
-        <p14:creationId xmlns:p14="http://schemas.microsoft.com/office/powerpoint/2010/main" val="1038865191"/>
-      </p:ext>
-    </p:extLst>
-  </p:cSld>
-  <p:clrMapOvr>
-    <a:masterClrMapping/>
-  </p:clrMapOvr>
-</p:sld>
-</file>
-
-<file path=ppt/slides/slide3.xml><?xml version="1.0" encoding="utf-8"?>
-<p:sld xmlns:a="http://schemas.openxmlformats.org/drawingml/2006/main" xmlns:r="http://schemas.openxmlformats.org/officeDocument/2006/relationships" xmlns:p="http://schemas.openxmlformats.org/presentationml/2006/main">
-  <p:cSld>
-    <p:spTree>
-      <p:nvGrpSpPr>
-        <p:cNvPr id="1" name=""/>
-        <p:cNvGrpSpPr/>
-        <p:nvPr/>
-      </p:nvGrpSpPr>
-      <p:grpSpPr>
-        <a:xfrm>
-          <a:off x="0" y="0"/>
-          <a:ext cx="0" cy="0"/>
-          <a:chOff x="0" y="0"/>
-          <a:chExt cx="0" cy="0"/>
-        </a:xfrm>
-      </p:grpSpPr>
-      <p:sp>
-        <p:nvSpPr>
-          <p:cNvPr id="2" name="Title 1">
-            <a:extLst>
-              <a:ext uri="{FF2B5EF4-FFF2-40B4-BE49-F238E27FC236}">
-                <a16:creationId xmlns:a16="http://schemas.microsoft.com/office/drawing/2014/main" id="{ECE11621-216B-1353-93F9-2735769FF8FF}"/>
-              </a:ext>
-            </a:extLst>
-          </p:cNvPr>
-          <p:cNvSpPr>
-            <a:spLocks noGrp="1"/>
-          </p:cNvSpPr>
-          <p:nvPr>
-            <p:ph type="title"/>
-          </p:nvPr>
-        </p:nvSpPr>
-        <p:spPr/>
-        <p:txBody>
-          <a:bodyPr/>
-          <a:lstStyle/>
-          <a:p>
-            <a:r>
-              <a:rPr lang="en-US" dirty="0"/>
-              <a:t>Models </a:t>
-            </a:r>
-          </a:p>
-        </p:txBody>
-      </p:sp>
-      <p:sp>
-        <p:nvSpPr>
-          <p:cNvPr id="3" name="Content Placeholder 2">
-            <a:extLst>
-              <a:ext uri="{FF2B5EF4-FFF2-40B4-BE49-F238E27FC236}">
-                <a16:creationId xmlns:a16="http://schemas.microsoft.com/office/drawing/2014/main" id="{71B35368-F185-512E-8D1D-FE790A6F7067}"/>
-              </a:ext>
-            </a:extLst>
-          </p:cNvPr>
-          <p:cNvSpPr>
-            <a:spLocks noGrp="1"/>
-          </p:cNvSpPr>
-          <p:nvPr>
-            <p:ph idx="1"/>
-          </p:nvPr>
-        </p:nvSpPr>
-        <p:spPr/>
-        <p:txBody>
-          <a:bodyPr/>
-          <a:lstStyle/>
-          <a:p>
-            <a:endParaRPr lang="en-US"/>
-          </a:p>
-        </p:txBody>
-      </p:sp>
-    </p:spTree>
-    <p:extLst>
-      <p:ext uri="{BB962C8B-B14F-4D97-AF65-F5344CB8AC3E}">
-        <p14:creationId xmlns:p14="http://schemas.microsoft.com/office/powerpoint/2010/main" val="1532138533"/>
-      </p:ext>
-    </p:extLst>
-  </p:cSld>
-  <p:clrMapOvr>
-    <a:masterClrMapping/>
-  </p:clrMapOvr>
-</p:sld>
-</file>
-
-<file path=ppt/slides/slide4.xml><?xml version="1.0" encoding="utf-8"?>
-<p:sld xmlns:a="http://schemas.openxmlformats.org/drawingml/2006/main" xmlns:r="http://schemas.openxmlformats.org/officeDocument/2006/relationships" xmlns:p="http://schemas.openxmlformats.org/presentationml/2006/main">
-  <p:cSld>
-    <p:spTree>
-      <p:nvGrpSpPr>
-        <p:cNvPr id="1" name=""/>
-        <p:cNvGrpSpPr/>
-        <p:nvPr/>
-      </p:nvGrpSpPr>
-      <p:grpSpPr>
-        <a:xfrm>
-          <a:off x="0" y="0"/>
-          <a:ext cx="0" cy="0"/>
-          <a:chOff x="0" y="0"/>
-          <a:chExt cx="0" cy="0"/>
-        </a:xfrm>
-      </p:grpSpPr>
-      <p:sp>
-        <p:nvSpPr>
-          <p:cNvPr id="2" name="Title 1">
-            <a:extLst>
-              <a:ext uri="{FF2B5EF4-FFF2-40B4-BE49-F238E27FC236}">
-                <a16:creationId xmlns:a16="http://schemas.microsoft.com/office/drawing/2014/main" id="{81912C78-183B-ADF3-0F4E-273E285176D1}"/>
-              </a:ext>
-            </a:extLst>
-          </p:cNvPr>
-          <p:cNvSpPr>
-            <a:spLocks noGrp="1"/>
-          </p:cNvSpPr>
-          <p:nvPr>
-            <p:ph type="title"/>
-          </p:nvPr>
-        </p:nvSpPr>
-        <p:spPr/>
-        <p:txBody>
-          <a:bodyPr/>
-          <a:lstStyle/>
-          <a:p>
-            <a:r>
-              <a:rPr lang="en-US" dirty="0"/>
-              <a:t>Predictions</a:t>
-            </a:r>
-          </a:p>
-        </p:txBody>
-      </p:sp>
-      <p:sp>
-        <p:nvSpPr>
-          <p:cNvPr id="3" name="Content Placeholder 2">
-            <a:extLst>
-              <a:ext uri="{FF2B5EF4-FFF2-40B4-BE49-F238E27FC236}">
-                <a16:creationId xmlns:a16="http://schemas.microsoft.com/office/drawing/2014/main" id="{AFB03D3F-34E5-DCA2-8A8C-EDA8DE29671D}"/>
-              </a:ext>
-            </a:extLst>
-          </p:cNvPr>
-          <p:cNvSpPr>
-            <a:spLocks noGrp="1"/>
-          </p:cNvSpPr>
-          <p:nvPr>
-            <p:ph idx="1"/>
-          </p:nvPr>
-        </p:nvSpPr>
-        <p:spPr/>
-        <p:txBody>
-          <a:bodyPr/>
-          <a:lstStyle/>
-          <a:p>
-            <a:endParaRPr lang="en-US"/>
-          </a:p>
-        </p:txBody>
-      </p:sp>
-    </p:spTree>
-    <p:extLst>
-      <p:ext uri="{BB962C8B-B14F-4D97-AF65-F5344CB8AC3E}">
-        <p14:creationId xmlns:p14="http://schemas.microsoft.com/office/powerpoint/2010/main" val="2427808491"/>
+        <p14:creationId xmlns:p14="http://schemas.microsoft.com/office/powerpoint/2010/main" val="170627478"/>
       </p:ext>
     </p:extLst>
   </p:cSld>
@@ -4087,4 +4825,299 @@
     </a:ext>
   </a:extLst>
 </a:theme>
+</file>
+
+<file path=ppt/theme/theme2.xml><?xml version="1.0" encoding="utf-8"?>
+<a:theme xmlns:a="http://schemas.openxmlformats.org/drawingml/2006/main" name="Office Theme">
+  <a:themeElements>
+    <a:clrScheme name="Office">
+      <a:dk1>
+        <a:sysClr val="windowText" lastClr="000000"/>
+      </a:dk1>
+      <a:lt1>
+        <a:sysClr val="window" lastClr="FFFFFF"/>
+      </a:lt1>
+      <a:dk2>
+        <a:srgbClr val="44546A"/>
+      </a:dk2>
+      <a:lt2>
+        <a:srgbClr val="E7E6E6"/>
+      </a:lt2>
+      <a:accent1>
+        <a:srgbClr val="4472C4"/>
+      </a:accent1>
+      <a:accent2>
+        <a:srgbClr val="ED7D31"/>
+      </a:accent2>
+      <a:accent3>
+        <a:srgbClr val="A5A5A5"/>
+      </a:accent3>
+      <a:accent4>
+        <a:srgbClr val="FFC000"/>
+      </a:accent4>
+      <a:accent5>
+        <a:srgbClr val="5B9BD5"/>
+      </a:accent5>
+      <a:accent6>
+        <a:srgbClr val="70AD47"/>
+      </a:accent6>
+      <a:hlink>
+        <a:srgbClr val="0563C1"/>
+      </a:hlink>
+      <a:folHlink>
+        <a:srgbClr val="954F72"/>
+      </a:folHlink>
+    </a:clrScheme>
+    <a:fontScheme name="Office">
+      <a:majorFont>
+        <a:latin typeface="Calibri Light" panose="020F0302020204030204"/>
+        <a:ea typeface=""/>
+        <a:cs typeface=""/>
+        <a:font script="Jpan" typeface="游ゴシック Light"/>
+        <a:font script="Hang" typeface="맑은 고딕"/>
+        <a:font script="Hans" typeface="等线 Light"/>
+        <a:font script="Hant" typeface="新細明體"/>
+        <a:font script="Arab" typeface="Times New Roman"/>
+        <a:font script="Hebr" typeface="Times New Roman"/>
+        <a:font script="Thai" typeface="Angsana New"/>
+        <a:font script="Ethi" typeface="Nyala"/>
+        <a:font script="Beng" typeface="Vrinda"/>
+        <a:font script="Gujr" typeface="Shruti"/>
+        <a:font script="Khmr" typeface="MoolBoran"/>
+        <a:font script="Knda" typeface="Tunga"/>
+        <a:font script="Guru" typeface="Raavi"/>
+        <a:font script="Cans" typeface="Euphemia"/>
+        <a:font script="Cher" typeface="Plantagenet Cherokee"/>
+        <a:font script="Yiii" typeface="Microsoft Yi Baiti"/>
+        <a:font script="Tibt" typeface="Microsoft Himalaya"/>
+        <a:font script="Thaa" typeface="MV Boli"/>
+        <a:font script="Deva" typeface="Mangal"/>
+        <a:font script="Telu" typeface="Gautami"/>
+        <a:font script="Taml" typeface="Latha"/>
+        <a:font script="Syrc" typeface="Estrangelo Edessa"/>
+        <a:font script="Orya" typeface="Kalinga"/>
+        <a:font script="Mlym" typeface="Kartika"/>
+        <a:font script="Laoo" typeface="DokChampa"/>
+        <a:font script="Sinh" typeface="Iskoola Pota"/>
+        <a:font script="Mong" typeface="Mongolian Baiti"/>
+        <a:font script="Viet" typeface="Times New Roman"/>
+        <a:font script="Uigh" typeface="Microsoft Uighur"/>
+        <a:font script="Geor" typeface="Sylfaen"/>
+        <a:font script="Armn" typeface="Arial"/>
+        <a:font script="Bugi" typeface="Leelawadee UI"/>
+        <a:font script="Bopo" typeface="Microsoft JhengHei"/>
+        <a:font script="Java" typeface="Javanese Text"/>
+        <a:font script="Lisu" typeface="Segoe UI"/>
+        <a:font script="Mymr" typeface="Myanmar Text"/>
+        <a:font script="Nkoo" typeface="Ebrima"/>
+        <a:font script="Olck" typeface="Nirmala UI"/>
+        <a:font script="Osma" typeface="Ebrima"/>
+        <a:font script="Phag" typeface="Phagspa"/>
+        <a:font script="Syrn" typeface="Estrangelo Edessa"/>
+        <a:font script="Syrj" typeface="Estrangelo Edessa"/>
+        <a:font script="Syre" typeface="Estrangelo Edessa"/>
+        <a:font script="Sora" typeface="Nirmala UI"/>
+        <a:font script="Tale" typeface="Microsoft Tai Le"/>
+        <a:font script="Talu" typeface="Microsoft New Tai Lue"/>
+        <a:font script="Tfng" typeface="Ebrima"/>
+      </a:majorFont>
+      <a:minorFont>
+        <a:latin typeface="Calibri" panose="020F0502020204030204"/>
+        <a:ea typeface=""/>
+        <a:cs typeface=""/>
+        <a:font script="Jpan" typeface="游ゴシック"/>
+        <a:font script="Hang" typeface="맑은 고딕"/>
+        <a:font script="Hans" typeface="等线"/>
+        <a:font script="Hant" typeface="新細明體"/>
+        <a:font script="Arab" typeface="Arial"/>
+        <a:font script="Hebr" typeface="Arial"/>
+        <a:font script="Thai" typeface="Cordia New"/>
+        <a:font script="Ethi" typeface="Nyala"/>
+        <a:font script="Beng" typeface="Vrinda"/>
+        <a:font script="Gujr" typeface="Shruti"/>
+        <a:font script="Khmr" typeface="DaunPenh"/>
+        <a:font script="Knda" typeface="Tunga"/>
+        <a:font script="Guru" typeface="Raavi"/>
+        <a:font script="Cans" typeface="Euphemia"/>
+        <a:font script="Cher" typeface="Plantagenet Cherokee"/>
+        <a:font script="Yiii" typeface="Microsoft Yi Baiti"/>
+        <a:font script="Tibt" typeface="Microsoft Himalaya"/>
+        <a:font script="Thaa" typeface="MV Boli"/>
+        <a:font script="Deva" typeface="Mangal"/>
+        <a:font script="Telu" typeface="Gautami"/>
+        <a:font script="Taml" typeface="Latha"/>
+        <a:font script="Syrc" typeface="Estrangelo Edessa"/>
+        <a:font script="Orya" typeface="Kalinga"/>
+        <a:font script="Mlym" typeface="Kartika"/>
+        <a:font script="Laoo" typeface="DokChampa"/>
+        <a:font script="Sinh" typeface="Iskoola Pota"/>
+        <a:font script="Mong" typeface="Mongolian Baiti"/>
+        <a:font script="Viet" typeface="Arial"/>
+        <a:font script="Uigh" typeface="Microsoft Uighur"/>
+        <a:font script="Geor" typeface="Sylfaen"/>
+        <a:font script="Armn" typeface="Arial"/>
+        <a:font script="Bugi" typeface="Leelawadee UI"/>
+        <a:font script="Bopo" typeface="Microsoft JhengHei"/>
+        <a:font script="Java" typeface="Javanese Text"/>
+        <a:font script="Lisu" typeface="Segoe UI"/>
+        <a:font script="Mymr" typeface="Myanmar Text"/>
+        <a:font script="Nkoo" typeface="Ebrima"/>
+        <a:font script="Olck" typeface="Nirmala UI"/>
+        <a:font script="Osma" typeface="Ebrima"/>
+        <a:font script="Phag" typeface="Phagspa"/>
+        <a:font script="Syrn" typeface="Estrangelo Edessa"/>
+        <a:font script="Syrj" typeface="Estrangelo Edessa"/>
+        <a:font script="Syre" typeface="Estrangelo Edessa"/>
+        <a:font script="Sora" typeface="Nirmala UI"/>
+        <a:font script="Tale" typeface="Microsoft Tai Le"/>
+        <a:font script="Talu" typeface="Microsoft New Tai Lue"/>
+        <a:font script="Tfng" typeface="Ebrima"/>
+      </a:minorFont>
+    </a:fontScheme>
+    <a:fmtScheme name="Office">
+      <a:fillStyleLst>
+        <a:solidFill>
+          <a:schemeClr val="phClr"/>
+        </a:solidFill>
+        <a:gradFill rotWithShape="1">
+          <a:gsLst>
+            <a:gs pos="0">
+              <a:schemeClr val="phClr">
+                <a:lumMod val="110000"/>
+                <a:satMod val="105000"/>
+                <a:tint val="67000"/>
+              </a:schemeClr>
+            </a:gs>
+            <a:gs pos="50000">
+              <a:schemeClr val="phClr">
+                <a:lumMod val="105000"/>
+                <a:satMod val="103000"/>
+                <a:tint val="73000"/>
+              </a:schemeClr>
+            </a:gs>
+            <a:gs pos="100000">
+              <a:schemeClr val="phClr">
+                <a:lumMod val="105000"/>
+                <a:satMod val="109000"/>
+                <a:tint val="81000"/>
+              </a:schemeClr>
+            </a:gs>
+          </a:gsLst>
+          <a:lin ang="5400000" scaled="0"/>
+        </a:gradFill>
+        <a:gradFill rotWithShape="1">
+          <a:gsLst>
+            <a:gs pos="0">
+              <a:schemeClr val="phClr">
+                <a:satMod val="103000"/>
+                <a:lumMod val="102000"/>
+                <a:tint val="94000"/>
+              </a:schemeClr>
+            </a:gs>
+            <a:gs pos="50000">
+              <a:schemeClr val="phClr">
+                <a:satMod val="110000"/>
+                <a:lumMod val="100000"/>
+                <a:shade val="100000"/>
+              </a:schemeClr>
+            </a:gs>
+            <a:gs pos="100000">
+              <a:schemeClr val="phClr">
+                <a:lumMod val="99000"/>
+                <a:satMod val="120000"/>
+                <a:shade val="78000"/>
+              </a:schemeClr>
+            </a:gs>
+          </a:gsLst>
+          <a:lin ang="5400000" scaled="0"/>
+        </a:gradFill>
+      </a:fillStyleLst>
+      <a:lnStyleLst>
+        <a:ln w="6350" cap="flat" cmpd="sng" algn="ctr">
+          <a:solidFill>
+            <a:schemeClr val="phClr"/>
+          </a:solidFill>
+          <a:prstDash val="solid"/>
+          <a:miter lim="800000"/>
+        </a:ln>
+        <a:ln w="12700" cap="flat" cmpd="sng" algn="ctr">
+          <a:solidFill>
+            <a:schemeClr val="phClr"/>
+          </a:solidFill>
+          <a:prstDash val="solid"/>
+          <a:miter lim="800000"/>
+        </a:ln>
+        <a:ln w="19050" cap="flat" cmpd="sng" algn="ctr">
+          <a:solidFill>
+            <a:schemeClr val="phClr"/>
+          </a:solidFill>
+          <a:prstDash val="solid"/>
+          <a:miter lim="800000"/>
+        </a:ln>
+      </a:lnStyleLst>
+      <a:effectStyleLst>
+        <a:effectStyle>
+          <a:effectLst/>
+        </a:effectStyle>
+        <a:effectStyle>
+          <a:effectLst/>
+        </a:effectStyle>
+        <a:effectStyle>
+          <a:effectLst>
+            <a:outerShdw blurRad="57150" dist="19050" dir="5400000" algn="ctr" rotWithShape="0">
+              <a:srgbClr val="000000">
+                <a:alpha val="63000"/>
+              </a:srgbClr>
+            </a:outerShdw>
+          </a:effectLst>
+        </a:effectStyle>
+      </a:effectStyleLst>
+      <a:bgFillStyleLst>
+        <a:solidFill>
+          <a:schemeClr val="phClr"/>
+        </a:solidFill>
+        <a:solidFill>
+          <a:schemeClr val="phClr">
+            <a:tint val="95000"/>
+            <a:satMod val="170000"/>
+          </a:schemeClr>
+        </a:solidFill>
+        <a:gradFill rotWithShape="1">
+          <a:gsLst>
+            <a:gs pos="0">
+              <a:schemeClr val="phClr">
+                <a:tint val="93000"/>
+                <a:satMod val="150000"/>
+                <a:shade val="98000"/>
+                <a:lumMod val="102000"/>
+              </a:schemeClr>
+            </a:gs>
+            <a:gs pos="50000">
+              <a:schemeClr val="phClr">
+                <a:tint val="98000"/>
+                <a:satMod val="130000"/>
+                <a:shade val="90000"/>
+                <a:lumMod val="103000"/>
+              </a:schemeClr>
+            </a:gs>
+            <a:gs pos="100000">
+              <a:schemeClr val="phClr">
+                <a:shade val="63000"/>
+                <a:satMod val="120000"/>
+              </a:schemeClr>
+            </a:gs>
+          </a:gsLst>
+          <a:lin ang="5400000" scaled="0"/>
+        </a:gradFill>
+      </a:bgFillStyleLst>
+    </a:fmtScheme>
+  </a:themeElements>
+  <a:objectDefaults/>
+  <a:extraClrSchemeLst/>
+  <a:extLst>
+    <a:ext uri="{05A4C25C-085E-4340-85A3-A5531E510DB2}">
+      <thm15:themeFamily xmlns:thm15="http://schemas.microsoft.com/office/thememl/2012/main" name="Office Theme" id="{62F939B6-93AF-4DB8-9C6B-D6C7DFDC589F}" vid="{4A3C46E8-61CC-4603-A589-7422A47A8E4A}"/>
+    </a:ext>
+  </a:extLst>
+</a:theme>
 </file>
</xml_diff>